<commit_message>
Please enter the commit message for your changes. Lines starting modified:   presentation_generator.py
</commit_message>
<xml_diff>
--- a/presentations/presentation_01_Практическая_работа_1_Информация_Объем_информации_Единицы_измерения_информации.pptx
+++ b/presentations/presentation_01_Практическая_работа_1_Информация_Объем_информации_Единицы_измерения_информации.pptx
@@ -3172,24 +3172,17 @@
       <p:grpSpPr/>
       <p:sp>
         <p:nvSpPr>
-          <p:cNvPr id="2" name="TextBox 1"/>
-          <p:cNvSpPr txBox="1"/>
-          <p:nvPr/>
-        </p:nvSpPr>
-        <p:spPr>
-          <a:xfrm>
-            <a:off x="457200" y="457200"/>
-            <a:ext cx="8229600" cy="914400"/>
-          </a:xfrm>
-          <a:prstGeom prst="rect">
-            <a:avLst/>
-          </a:prstGeom>
-          <a:noFill/>
-        </p:spPr>
-        <p:txBody>
-          <a:bodyPr wrap="none">
-            <a:spAutoFit/>
-          </a:bodyPr>
+          <p:cNvPr id="2" name="Title 1"/>
+          <p:cNvSpPr>
+            <a:spLocks noGrp="1"/>
+          </p:cNvSpPr>
+          <p:nvPr>
+            <p:ph type="title"/>
+          </p:nvPr>
+        </p:nvSpPr>
+        <p:spPr/>
+        <p:txBody>
+          <a:bodyPr/>
           <a:lstStyle/>
           <a:p>
             <a:pPr>
@@ -3208,27 +3201,21 @@
       </p:sp>
       <p:sp>
         <p:nvSpPr>
-          <p:cNvPr id="3" name="TextBox 2"/>
-          <p:cNvSpPr txBox="1"/>
-          <p:nvPr/>
-        </p:nvSpPr>
-        <p:spPr>
-          <a:xfrm>
-            <a:off x="457200" y="1371600"/>
-            <a:ext cx="8229600" cy="5029200"/>
-          </a:xfrm>
-          <a:prstGeom prst="rect">
-            <a:avLst/>
-          </a:prstGeom>
-          <a:noFill/>
-        </p:spPr>
-        <p:txBody>
-          <a:bodyPr wrap="none">
-            <a:spAutoFit/>
-          </a:bodyPr>
-          <a:lstStyle/>
-          <a:p>
-            <a:pPr>
+          <p:cNvPr id="3" name="Content Placeholder 2"/>
+          <p:cNvSpPr>
+            <a:spLocks noGrp="1"/>
+          </p:cNvSpPr>
+          <p:nvPr>
+            <p:ph idx="1"/>
+          </p:nvPr>
+        </p:nvSpPr>
+        <p:spPr/>
+        <p:txBody>
+          <a:bodyPr/>
+          <a:lstStyle/>
+          <a:p>
+            <a:pPr>
+              <a:buNone/>
               <a:defRPr sz="1400" b="1">
                 <a:solidFill>
                   <a:srgbClr val="444444"/>
@@ -3237,11 +3224,26 @@
               </a:defRPr>
             </a:pPr>
             <a:r>
-              <a:t>Цель: Сформировать у обучающихся практические навыки расчета информационного объема данных и перевода между различными единицами измерения информации.</a:t>
-            </a:r>
-          </a:p>
-          <a:p>
-            <a:pPr>
+              <a:t>Цель:</a:t>
+            </a:r>
+          </a:p>
+          <a:p>
+            <a:pPr>
+              <a:buNone/>
+              <a:defRPr sz="1400">
+                <a:solidFill>
+                  <a:srgbClr val="444444"/>
+                </a:solidFill>
+                <a:latin typeface="Calibri"/>
+              </a:defRPr>
+            </a:pPr>
+            <a:r>
+              <a:t>Сформировать у обучающихся практические навыки расчета информационного объема данных и перевода между различными единицами измерения информации.</a:t>
+            </a:r>
+          </a:p>
+          <a:p>
+            <a:pPr>
+              <a:buNone/>
               <a:defRPr sz="1400" b="1">
                 <a:solidFill>
                   <a:srgbClr val="444444"/>
@@ -3254,7 +3256,7 @@
             </a:r>
           </a:p>
           <a:p>
-            <a:pPr>
+            <a:pPr marL="360000">
               <a:defRPr sz="1400">
                 <a:solidFill>
                   <a:srgbClr val="444444"/>
@@ -3263,11 +3265,11 @@
               </a:defRPr>
             </a:pPr>
             <a:r>
-              <a:t>Закрепить понимание основных единиц измерения информации: бит, байт, килобайт, мегабайт, гигабайт.</a:t>
-            </a:r>
-          </a:p>
-          <a:p>
-            <a:pPr>
+              <a:t>- Закрепить понимание основных единиц измерения информации: бит, байт, килобайт, мегабайт, гигабайт.</a:t>
+            </a:r>
+          </a:p>
+          <a:p>
+            <a:pPr marL="360000">
               <a:defRPr sz="1400">
                 <a:solidFill>
                   <a:srgbClr val="444444"/>
@@ -3276,11 +3278,11 @@
               </a:defRPr>
             </a:pPr>
             <a:r>
-              <a:t>Научиться применять формулы для перевода единиц измерения информации.</a:t>
-            </a:r>
-          </a:p>
-          <a:p>
-            <a:pPr>
+              <a:t>- Научиться применять формулы для перевода единиц измерения информации.</a:t>
+            </a:r>
+          </a:p>
+          <a:p>
+            <a:pPr marL="360000">
               <a:defRPr sz="1400">
                 <a:solidFill>
                   <a:srgbClr val="444444"/>
@@ -3289,11 +3291,11 @@
               </a:defRPr>
             </a:pPr>
             <a:r>
-              <a:t>Отработать навык расчета информационного объема текстовых сообщений.</a:t>
-            </a:r>
-          </a:p>
-          <a:p>
-            <a:pPr>
+              <a:t>- Отработать навык расчета информационного объема текстовых сообщений.</a:t>
+            </a:r>
+          </a:p>
+          <a:p>
+            <a:pPr marL="360000">
               <a:defRPr sz="1400">
                 <a:solidFill>
                   <a:srgbClr val="444444"/>
@@ -3302,7 +3304,7 @@
               </a:defRPr>
             </a:pPr>
             <a:r>
-              <a:t>Научиться применять полученные знания для решения практических задач, связанных с реальными объектами (файлами, изображениями).</a:t>
+              <a:t>- Научиться применять полученные знания для решения практических задач, связанных с реальными объектами (файлами, изображениями).</a:t>
             </a:r>
           </a:p>
         </p:txBody>
@@ -3327,24 +3329,17 @@
       <p:grpSpPr/>
       <p:sp>
         <p:nvSpPr>
-          <p:cNvPr id="2" name="TextBox 1"/>
-          <p:cNvSpPr txBox="1"/>
-          <p:nvPr/>
-        </p:nvSpPr>
-        <p:spPr>
-          <a:xfrm>
-            <a:off x="457200" y="457200"/>
-            <a:ext cx="8229600" cy="914400"/>
-          </a:xfrm>
-          <a:prstGeom prst="rect">
-            <a:avLst/>
-          </a:prstGeom>
-          <a:noFill/>
-        </p:spPr>
-        <p:txBody>
-          <a:bodyPr wrap="none">
-            <a:spAutoFit/>
-          </a:bodyPr>
+          <p:cNvPr id="2" name="Title 1"/>
+          <p:cNvSpPr>
+            <a:spLocks noGrp="1"/>
+          </p:cNvSpPr>
+          <p:nvPr>
+            <p:ph type="title"/>
+          </p:nvPr>
+        </p:nvSpPr>
+        <p:spPr/>
+        <p:txBody>
+          <a:bodyPr/>
           <a:lstStyle/>
           <a:p>
             <a:pPr>
@@ -3363,27 +3358,21 @@
       </p:sp>
       <p:sp>
         <p:nvSpPr>
-          <p:cNvPr id="3" name="TextBox 2"/>
-          <p:cNvSpPr txBox="1"/>
-          <p:nvPr/>
-        </p:nvSpPr>
-        <p:spPr>
-          <a:xfrm>
-            <a:off x="457200" y="1371600"/>
-            <a:ext cx="8229600" cy="5029200"/>
-          </a:xfrm>
-          <a:prstGeom prst="rect">
-            <a:avLst/>
-          </a:prstGeom>
-          <a:noFill/>
-        </p:spPr>
-        <p:txBody>
-          <a:bodyPr wrap="none">
-            <a:spAutoFit/>
-          </a:bodyPr>
-          <a:lstStyle/>
-          <a:p>
-            <a:pPr>
+          <p:cNvPr id="3" name="Content Placeholder 2"/>
+          <p:cNvSpPr>
+            <a:spLocks noGrp="1"/>
+          </p:cNvSpPr>
+          <p:nvPr>
+            <p:ph idx="1"/>
+          </p:nvPr>
+        </p:nvSpPr>
+        <p:spPr/>
+        <p:txBody>
+          <a:bodyPr/>
+          <a:lstStyle/>
+          <a:p>
+            <a:pPr>
+              <a:buNone/>
               <a:defRPr sz="1400">
                 <a:solidFill>
                   <a:srgbClr val="444444"/>
@@ -3397,6 +3386,7 @@
           </a:p>
           <a:p>
             <a:pPr>
+              <a:buNone/>
               <a:defRPr sz="1400">
                 <a:solidFill>
                   <a:srgbClr val="444444"/>
@@ -3410,6 +3400,7 @@
           </a:p>
           <a:p>
             <a:pPr>
+              <a:buNone/>
               <a:defRPr sz="1400">
                 <a:solidFill>
                   <a:srgbClr val="444444"/>
@@ -3423,6 +3414,7 @@
           </a:p>
           <a:p>
             <a:pPr>
+              <a:buNone/>
               <a:defRPr sz="1400">
                 <a:solidFill>
                   <a:srgbClr val="444444"/>
@@ -3436,6 +3428,7 @@
           </a:p>
           <a:p>
             <a:pPr>
+              <a:buNone/>
               <a:defRPr sz="1400">
                 <a:solidFill>
                   <a:srgbClr val="444444"/>
@@ -3449,6 +3442,7 @@
           </a:p>
           <a:p>
             <a:pPr>
+              <a:buNone/>
               <a:defRPr sz="1400">
                 <a:solidFill>
                   <a:srgbClr val="444444"/>
@@ -3462,6 +3456,7 @@
           </a:p>
           <a:p>
             <a:pPr>
+              <a:buNone/>
               <a:defRPr sz="1400">
                 <a:solidFill>
                   <a:srgbClr val="444444"/>
@@ -3475,6 +3470,7 @@
           </a:p>
           <a:p>
             <a:pPr>
+              <a:buNone/>
               <a:defRPr sz="1400">
                 <a:solidFill>
                   <a:srgbClr val="444444"/>
@@ -3488,6 +3484,7 @@
           </a:p>
           <a:p>
             <a:pPr>
+              <a:buNone/>
               <a:defRPr sz="1400" b="1">
                 <a:solidFill>
                   <a:srgbClr val="444444"/>
@@ -3501,6 +3498,7 @@
           </a:p>
           <a:p>
             <a:pPr>
+              <a:buNone/>
               <a:defRPr sz="1400">
                 <a:solidFill>
                   <a:srgbClr val="444444"/>
@@ -3514,6 +3512,7 @@
           </a:p>
           <a:p>
             <a:pPr>
+              <a:buNone/>
               <a:defRPr sz="1400" b="1">
                 <a:solidFill>
                   <a:srgbClr val="444444"/>
@@ -3527,6 +3526,7 @@
           </a:p>
           <a:p>
             <a:pPr>
+              <a:buNone/>
               <a:defRPr sz="1400">
                 <a:solidFill>
                   <a:srgbClr val="444444"/>
@@ -3560,24 +3560,17 @@
       <p:grpSpPr/>
       <p:sp>
         <p:nvSpPr>
-          <p:cNvPr id="2" name="TextBox 1"/>
-          <p:cNvSpPr txBox="1"/>
-          <p:nvPr/>
-        </p:nvSpPr>
-        <p:spPr>
-          <a:xfrm>
-            <a:off x="457200" y="457200"/>
-            <a:ext cx="8229600" cy="914400"/>
-          </a:xfrm>
-          <a:prstGeom prst="rect">
-            <a:avLst/>
-          </a:prstGeom>
-          <a:noFill/>
-        </p:spPr>
-        <p:txBody>
-          <a:bodyPr wrap="none">
-            <a:spAutoFit/>
-          </a:bodyPr>
+          <p:cNvPr id="2" name="Title 1"/>
+          <p:cNvSpPr>
+            <a:spLocks noGrp="1"/>
+          </p:cNvSpPr>
+          <p:nvPr>
+            <p:ph type="title"/>
+          </p:nvPr>
+        </p:nvSpPr>
+        <p:spPr/>
+        <p:txBody>
+          <a:bodyPr/>
           <a:lstStyle/>
           <a:p>
             <a:pPr>
@@ -3596,27 +3589,21 @@
       </p:sp>
       <p:sp>
         <p:nvSpPr>
-          <p:cNvPr id="3" name="TextBox 2"/>
-          <p:cNvSpPr txBox="1"/>
-          <p:nvPr/>
-        </p:nvSpPr>
-        <p:spPr>
-          <a:xfrm>
-            <a:off x="457200" y="1371600"/>
-            <a:ext cx="8229600" cy="5029200"/>
-          </a:xfrm>
-          <a:prstGeom prst="rect">
-            <a:avLst/>
-          </a:prstGeom>
-          <a:noFill/>
-        </p:spPr>
-        <p:txBody>
-          <a:bodyPr wrap="none">
-            <a:spAutoFit/>
-          </a:bodyPr>
-          <a:lstStyle/>
-          <a:p>
-            <a:pPr>
+          <p:cNvPr id="3" name="Content Placeholder 2"/>
+          <p:cNvSpPr>
+            <a:spLocks noGrp="1"/>
+          </p:cNvSpPr>
+          <p:nvPr>
+            <p:ph idx="1"/>
+          </p:nvPr>
+        </p:nvSpPr>
+        <p:spPr/>
+        <p:txBody>
+          <a:bodyPr/>
+          <a:lstStyle/>
+          <a:p>
+            <a:pPr>
+              <a:buNone/>
               <a:defRPr sz="1400" b="1">
                 <a:solidFill>
                   <a:srgbClr val="444444"/>
@@ -3630,6 +3617,7 @@
           </a:p>
           <a:p>
             <a:pPr>
+              <a:buNone/>
               <a:defRPr sz="1400" b="1">
                 <a:solidFill>
                   <a:srgbClr val="444444"/>
@@ -3643,6 +3631,7 @@
           </a:p>
           <a:p>
             <a:pPr>
+              <a:buNone/>
               <a:defRPr sz="1400" b="1">
                 <a:solidFill>
                   <a:srgbClr val="444444"/>
@@ -3656,6 +3645,7 @@
           </a:p>
           <a:p>
             <a:pPr>
+              <a:buNone/>
               <a:defRPr sz="1400" b="1">
                 <a:solidFill>
                   <a:srgbClr val="444444"/>
@@ -3669,6 +3659,7 @@
           </a:p>
           <a:p>
             <a:pPr>
+              <a:buNone/>
               <a:defRPr sz="1400" b="1">
                 <a:solidFill>
                   <a:srgbClr val="444444"/>
@@ -3682,6 +3673,7 @@
           </a:p>
           <a:p>
             <a:pPr>
+              <a:buNone/>
               <a:defRPr sz="1400" b="1">
                 <a:solidFill>
                   <a:srgbClr val="444444"/>
@@ -3715,24 +3707,17 @@
       <p:grpSpPr/>
       <p:sp>
         <p:nvSpPr>
-          <p:cNvPr id="2" name="TextBox 1"/>
-          <p:cNvSpPr txBox="1"/>
-          <p:nvPr/>
-        </p:nvSpPr>
-        <p:spPr>
-          <a:xfrm>
-            <a:off x="457200" y="457200"/>
-            <a:ext cx="8229600" cy="914400"/>
-          </a:xfrm>
-          <a:prstGeom prst="rect">
-            <a:avLst/>
-          </a:prstGeom>
-          <a:noFill/>
-        </p:spPr>
-        <p:txBody>
-          <a:bodyPr wrap="none">
-            <a:spAutoFit/>
-          </a:bodyPr>
+          <p:cNvPr id="2" name="Title 1"/>
+          <p:cNvSpPr>
+            <a:spLocks noGrp="1"/>
+          </p:cNvSpPr>
+          <p:nvPr>
+            <p:ph type="title"/>
+          </p:nvPr>
+        </p:nvSpPr>
+        <p:spPr/>
+        <p:txBody>
+          <a:bodyPr/>
           <a:lstStyle/>
           <a:p>
             <a:pPr>
@@ -3751,27 +3736,21 @@
       </p:sp>
       <p:sp>
         <p:nvSpPr>
-          <p:cNvPr id="3" name="TextBox 2"/>
-          <p:cNvSpPr txBox="1"/>
-          <p:nvPr/>
-        </p:nvSpPr>
-        <p:spPr>
-          <a:xfrm>
-            <a:off x="457200" y="1371600"/>
-            <a:ext cx="8229600" cy="5029200"/>
-          </a:xfrm>
-          <a:prstGeom prst="rect">
-            <a:avLst/>
-          </a:prstGeom>
-          <a:noFill/>
-        </p:spPr>
-        <p:txBody>
-          <a:bodyPr wrap="none">
-            <a:spAutoFit/>
-          </a:bodyPr>
-          <a:lstStyle/>
-          <a:p>
-            <a:pPr>
+          <p:cNvPr id="3" name="Content Placeholder 2"/>
+          <p:cNvSpPr>
+            <a:spLocks noGrp="1"/>
+          </p:cNvSpPr>
+          <p:nvPr>
+            <p:ph idx="1"/>
+          </p:nvPr>
+        </p:nvSpPr>
+        <p:spPr/>
+        <p:txBody>
+          <a:bodyPr/>
+          <a:lstStyle/>
+          <a:p>
+            <a:pPr>
+              <a:buNone/>
               <a:defRPr sz="1400" b="1">
                 <a:solidFill>
                   <a:srgbClr val="444444"/>
@@ -3785,6 +3764,7 @@
           </a:p>
           <a:p>
             <a:pPr>
+              <a:buNone/>
               <a:defRPr sz="1400" b="1">
                 <a:solidFill>
                   <a:srgbClr val="444444"/>
@@ -3798,6 +3778,7 @@
           </a:p>
           <a:p>
             <a:pPr>
+              <a:buNone/>
               <a:defRPr sz="1400" b="1">
                 <a:solidFill>
                   <a:srgbClr val="444444"/>
@@ -3811,6 +3792,7 @@
           </a:p>
           <a:p>
             <a:pPr>
+              <a:buNone/>
               <a:defRPr sz="1400" b="1">
                 <a:solidFill>
                   <a:srgbClr val="444444"/>
@@ -3824,6 +3806,7 @@
           </a:p>
           <a:p>
             <a:pPr>
+              <a:buNone/>
               <a:defRPr sz="1400" b="1">
                 <a:solidFill>
                   <a:srgbClr val="444444"/>
@@ -3857,24 +3840,17 @@
       <p:grpSpPr/>
       <p:sp>
         <p:nvSpPr>
-          <p:cNvPr id="2" name="TextBox 1"/>
-          <p:cNvSpPr txBox="1"/>
-          <p:nvPr/>
-        </p:nvSpPr>
-        <p:spPr>
-          <a:xfrm>
-            <a:off x="457200" y="457200"/>
-            <a:ext cx="8229600" cy="914400"/>
-          </a:xfrm>
-          <a:prstGeom prst="rect">
-            <a:avLst/>
-          </a:prstGeom>
-          <a:noFill/>
-        </p:spPr>
-        <p:txBody>
-          <a:bodyPr wrap="none">
-            <a:spAutoFit/>
-          </a:bodyPr>
+          <p:cNvPr id="2" name="Title 1"/>
+          <p:cNvSpPr>
+            <a:spLocks noGrp="1"/>
+          </p:cNvSpPr>
+          <p:nvPr>
+            <p:ph type="title"/>
+          </p:nvPr>
+        </p:nvSpPr>
+        <p:spPr/>
+        <p:txBody>
+          <a:bodyPr/>
           <a:lstStyle/>
           <a:p>
             <a:pPr>
@@ -3893,27 +3869,21 @@
       </p:sp>
       <p:sp>
         <p:nvSpPr>
-          <p:cNvPr id="3" name="TextBox 2"/>
-          <p:cNvSpPr txBox="1"/>
-          <p:nvPr/>
-        </p:nvSpPr>
-        <p:spPr>
-          <a:xfrm>
-            <a:off x="457200" y="1371600"/>
-            <a:ext cx="8229600" cy="5029200"/>
-          </a:xfrm>
-          <a:prstGeom prst="rect">
-            <a:avLst/>
-          </a:prstGeom>
-          <a:noFill/>
-        </p:spPr>
-        <p:txBody>
-          <a:bodyPr wrap="none">
-            <a:spAutoFit/>
-          </a:bodyPr>
-          <a:lstStyle/>
-          <a:p>
-            <a:pPr>
+          <p:cNvPr id="3" name="Content Placeholder 2"/>
+          <p:cNvSpPr>
+            <a:spLocks noGrp="1"/>
+          </p:cNvSpPr>
+          <p:nvPr>
+            <p:ph idx="1"/>
+          </p:nvPr>
+        </p:nvSpPr>
+        <p:spPr/>
+        <p:txBody>
+          <a:bodyPr/>
+          <a:lstStyle/>
+          <a:p>
+            <a:pPr>
+              <a:buNone/>
               <a:defRPr sz="1400" b="1">
                 <a:solidFill>
                   <a:srgbClr val="444444"/>
@@ -3927,6 +3897,7 @@
           </a:p>
           <a:p>
             <a:pPr>
+              <a:buNone/>
               <a:defRPr sz="1400">
                 <a:solidFill>
                   <a:srgbClr val="444444"/>
@@ -3940,6 +3911,7 @@
           </a:p>
           <a:p>
             <a:pPr>
+              <a:buNone/>
               <a:defRPr sz="1400">
                 <a:solidFill>
                   <a:srgbClr val="444444"/>
@@ -3953,6 +3925,7 @@
           </a:p>
           <a:p>
             <a:pPr>
+              <a:buNone/>
               <a:defRPr sz="1400">
                 <a:solidFill>
                   <a:srgbClr val="444444"/>
@@ -3966,6 +3939,7 @@
           </a:p>
           <a:p>
             <a:pPr>
+              <a:buNone/>
               <a:defRPr sz="1400">
                 <a:solidFill>
                   <a:srgbClr val="444444"/>
@@ -3979,6 +3953,7 @@
           </a:p>
           <a:p>
             <a:pPr>
+              <a:buNone/>
               <a:defRPr sz="1400">
                 <a:solidFill>
                   <a:srgbClr val="444444"/>
@@ -3992,6 +3967,7 @@
           </a:p>
           <a:p>
             <a:pPr>
+              <a:buNone/>
               <a:defRPr sz="1400">
                 <a:solidFill>
                   <a:srgbClr val="444444"/>
@@ -4005,6 +3981,7 @@
           </a:p>
           <a:p>
             <a:pPr>
+              <a:buNone/>
               <a:defRPr sz="1400">
                 <a:solidFill>
                   <a:srgbClr val="444444"/>
@@ -4018,6 +3995,7 @@
           </a:p>
           <a:p>
             <a:pPr>
+              <a:buNone/>
               <a:defRPr sz="1400" b="1">
                 <a:solidFill>
                   <a:srgbClr val="444444"/>
@@ -4031,6 +4009,7 @@
           </a:p>
           <a:p>
             <a:pPr>
+              <a:buNone/>
               <a:defRPr sz="1400">
                 <a:solidFill>
                   <a:srgbClr val="444444"/>
@@ -4044,6 +4023,7 @@
           </a:p>
           <a:p>
             <a:pPr>
+              <a:buNone/>
               <a:defRPr sz="1400">
                 <a:solidFill>
                   <a:srgbClr val="444444"/>
@@ -4057,6 +4037,7 @@
           </a:p>
           <a:p>
             <a:pPr>
+              <a:buNone/>
               <a:defRPr sz="1400">
                 <a:solidFill>
                   <a:srgbClr val="444444"/>
@@ -4070,6 +4051,7 @@
           </a:p>
           <a:p>
             <a:pPr>
+              <a:buNone/>
               <a:defRPr sz="1400">
                 <a:solidFill>
                   <a:srgbClr val="444444"/>
@@ -4083,6 +4065,7 @@
           </a:p>
           <a:p>
             <a:pPr>
+              <a:buNone/>
               <a:defRPr sz="1400">
                 <a:solidFill>
                   <a:srgbClr val="444444"/>
@@ -4096,6 +4079,7 @@
           </a:p>
           <a:p>
             <a:pPr>
+              <a:buNone/>
               <a:defRPr sz="1400">
                 <a:solidFill>
                   <a:srgbClr val="444444"/>
@@ -4129,24 +4113,17 @@
       <p:grpSpPr/>
       <p:sp>
         <p:nvSpPr>
-          <p:cNvPr id="2" name="TextBox 1"/>
-          <p:cNvSpPr txBox="1"/>
-          <p:nvPr/>
-        </p:nvSpPr>
-        <p:spPr>
-          <a:xfrm>
-            <a:off x="457200" y="457200"/>
-            <a:ext cx="8229600" cy="914400"/>
-          </a:xfrm>
-          <a:prstGeom prst="rect">
-            <a:avLst/>
-          </a:prstGeom>
-          <a:noFill/>
-        </p:spPr>
-        <p:txBody>
-          <a:bodyPr wrap="none">
-            <a:spAutoFit/>
-          </a:bodyPr>
+          <p:cNvPr id="2" name="Title 1"/>
+          <p:cNvSpPr>
+            <a:spLocks noGrp="1"/>
+          </p:cNvSpPr>
+          <p:nvPr>
+            <p:ph type="title"/>
+          </p:nvPr>
+        </p:nvSpPr>
+        <p:spPr/>
+        <p:txBody>
+          <a:bodyPr/>
           <a:lstStyle/>
           <a:p>
             <a:pPr>
@@ -4165,27 +4142,21 @@
       </p:sp>
       <p:sp>
         <p:nvSpPr>
-          <p:cNvPr id="3" name="TextBox 2"/>
-          <p:cNvSpPr txBox="1"/>
-          <p:nvPr/>
-        </p:nvSpPr>
-        <p:spPr>
-          <a:xfrm>
-            <a:off x="457200" y="1371600"/>
-            <a:ext cx="8229600" cy="5029200"/>
-          </a:xfrm>
-          <a:prstGeom prst="rect">
-            <a:avLst/>
-          </a:prstGeom>
-          <a:noFill/>
-        </p:spPr>
-        <p:txBody>
-          <a:bodyPr wrap="none">
-            <a:spAutoFit/>
-          </a:bodyPr>
-          <a:lstStyle/>
-          <a:p>
-            <a:pPr>
+          <p:cNvPr id="3" name="Content Placeholder 2"/>
+          <p:cNvSpPr>
+            <a:spLocks noGrp="1"/>
+          </p:cNvSpPr>
+          <p:nvPr>
+            <p:ph idx="1"/>
+          </p:nvPr>
+        </p:nvSpPr>
+        <p:spPr/>
+        <p:txBody>
+          <a:bodyPr/>
+          <a:lstStyle/>
+          <a:p>
+            <a:pPr>
+              <a:buNone/>
               <a:defRPr sz="1400">
                 <a:solidFill>
                   <a:srgbClr val="444444"/>
@@ -4199,6 +4170,7 @@
           </a:p>
           <a:p>
             <a:pPr>
+              <a:buNone/>
               <a:defRPr sz="1400">
                 <a:solidFill>
                   <a:srgbClr val="444444"/>
@@ -4212,6 +4184,7 @@
           </a:p>
           <a:p>
             <a:pPr>
+              <a:buNone/>
               <a:defRPr sz="1400">
                 <a:solidFill>
                   <a:srgbClr val="444444"/>
@@ -4225,6 +4198,7 @@
           </a:p>
           <a:p>
             <a:pPr>
+              <a:buNone/>
               <a:defRPr sz="1400">
                 <a:solidFill>
                   <a:srgbClr val="444444"/>
@@ -4238,6 +4212,7 @@
           </a:p>
           <a:p>
             <a:pPr>
+              <a:buNone/>
               <a:defRPr sz="1400">
                 <a:solidFill>
                   <a:srgbClr val="444444"/>

</xml_diff>